<commit_message>
Update Experiment 2 code
</commit_message>
<xml_diff>
--- a/stims/stimuli.pptx
+++ b/stims/stimuli.pptx
@@ -11,6 +11,7 @@
     <p:sldId id="259" r:id="rId5"/>
     <p:sldId id="260" r:id="rId6"/>
     <p:sldId id="261" r:id="rId7"/>
+    <p:sldId id="262" r:id="rId8"/>
   </p:sldIdLst>
   <p:sldSz cx="9144000" cy="6858000" type="screen4x3"/>
   <p:notesSz cx="6858000" cy="9144000"/>
@@ -248,7 +249,7 @@
           <a:p>
             <a:fld id="{997E1002-080B-48FA-8ED8-A5E73E340F63}" type="datetimeFigureOut">
               <a:rPr lang="en-AU" smtClean="0"/>
-              <a:t>2/04/2020</a:t>
+              <a:t>4/08/2020</a:t>
             </a:fld>
             <a:endParaRPr lang="en-AU"/>
           </a:p>
@@ -418,7 +419,7 @@
           <a:p>
             <a:fld id="{997E1002-080B-48FA-8ED8-A5E73E340F63}" type="datetimeFigureOut">
               <a:rPr lang="en-AU" smtClean="0"/>
-              <a:t>2/04/2020</a:t>
+              <a:t>4/08/2020</a:t>
             </a:fld>
             <a:endParaRPr lang="en-AU"/>
           </a:p>
@@ -598,7 +599,7 @@
           <a:p>
             <a:fld id="{997E1002-080B-48FA-8ED8-A5E73E340F63}" type="datetimeFigureOut">
               <a:rPr lang="en-AU" smtClean="0"/>
-              <a:t>2/04/2020</a:t>
+              <a:t>4/08/2020</a:t>
             </a:fld>
             <a:endParaRPr lang="en-AU"/>
           </a:p>
@@ -768,7 +769,7 @@
           <a:p>
             <a:fld id="{997E1002-080B-48FA-8ED8-A5E73E340F63}" type="datetimeFigureOut">
               <a:rPr lang="en-AU" smtClean="0"/>
-              <a:t>2/04/2020</a:t>
+              <a:t>4/08/2020</a:t>
             </a:fld>
             <a:endParaRPr lang="en-AU"/>
           </a:p>
@@ -1012,7 +1013,7 @@
           <a:p>
             <a:fld id="{997E1002-080B-48FA-8ED8-A5E73E340F63}" type="datetimeFigureOut">
               <a:rPr lang="en-AU" smtClean="0"/>
-              <a:t>2/04/2020</a:t>
+              <a:t>4/08/2020</a:t>
             </a:fld>
             <a:endParaRPr lang="en-AU"/>
           </a:p>
@@ -1244,7 +1245,7 @@
           <a:p>
             <a:fld id="{997E1002-080B-48FA-8ED8-A5E73E340F63}" type="datetimeFigureOut">
               <a:rPr lang="en-AU" smtClean="0"/>
-              <a:t>2/04/2020</a:t>
+              <a:t>4/08/2020</a:t>
             </a:fld>
             <a:endParaRPr lang="en-AU"/>
           </a:p>
@@ -1611,7 +1612,7 @@
           <a:p>
             <a:fld id="{997E1002-080B-48FA-8ED8-A5E73E340F63}" type="datetimeFigureOut">
               <a:rPr lang="en-AU" smtClean="0"/>
-              <a:t>2/04/2020</a:t>
+              <a:t>4/08/2020</a:t>
             </a:fld>
             <a:endParaRPr lang="en-AU"/>
           </a:p>
@@ -1729,7 +1730,7 @@
           <a:p>
             <a:fld id="{997E1002-080B-48FA-8ED8-A5E73E340F63}" type="datetimeFigureOut">
               <a:rPr lang="en-AU" smtClean="0"/>
-              <a:t>2/04/2020</a:t>
+              <a:t>4/08/2020</a:t>
             </a:fld>
             <a:endParaRPr lang="en-AU"/>
           </a:p>
@@ -1824,7 +1825,7 @@
           <a:p>
             <a:fld id="{997E1002-080B-48FA-8ED8-A5E73E340F63}" type="datetimeFigureOut">
               <a:rPr lang="en-AU" smtClean="0"/>
-              <a:t>2/04/2020</a:t>
+              <a:t>4/08/2020</a:t>
             </a:fld>
             <a:endParaRPr lang="en-AU"/>
           </a:p>
@@ -2101,7 +2102,7 @@
           <a:p>
             <a:fld id="{997E1002-080B-48FA-8ED8-A5E73E340F63}" type="datetimeFigureOut">
               <a:rPr lang="en-AU" smtClean="0"/>
-              <a:t>2/04/2020</a:t>
+              <a:t>4/08/2020</a:t>
             </a:fld>
             <a:endParaRPr lang="en-AU"/>
           </a:p>
@@ -2358,7 +2359,7 @@
           <a:p>
             <a:fld id="{997E1002-080B-48FA-8ED8-A5E73E340F63}" type="datetimeFigureOut">
               <a:rPr lang="en-AU" smtClean="0"/>
-              <a:t>2/04/2020</a:t>
+              <a:t>4/08/2020</a:t>
             </a:fld>
             <a:endParaRPr lang="en-AU"/>
           </a:p>
@@ -2571,7 +2572,7 @@
           <a:p>
             <a:fld id="{997E1002-080B-48FA-8ED8-A5E73E340F63}" type="datetimeFigureOut">
               <a:rPr lang="en-AU" smtClean="0"/>
-              <a:t>2/04/2020</a:t>
+              <a:t>4/08/2020</a:t>
             </a:fld>
             <a:endParaRPr lang="en-AU"/>
           </a:p>
@@ -3817,6 +3818,419 @@
 </p:sld>
 </file>
 
+<file path=ppt/slides/slide7.xml><?xml version="1.0" encoding="utf-8"?>
+<p:sld xmlns:a="http://schemas.openxmlformats.org/drawingml/2006/main" xmlns:r="http://schemas.openxmlformats.org/officeDocument/2006/relationships" xmlns:p="http://schemas.openxmlformats.org/presentationml/2006/main">
+  <p:cSld>
+    <p:spTree>
+      <p:nvGrpSpPr>
+        <p:cNvPr id="1" name=""/>
+        <p:cNvGrpSpPr/>
+        <p:nvPr/>
+      </p:nvGrpSpPr>
+      <p:grpSpPr>
+        <a:xfrm>
+          <a:off x="0" y="0"/>
+          <a:ext cx="0" cy="0"/>
+          <a:chOff x="0" y="0"/>
+          <a:chExt cx="0" cy="0"/>
+        </a:xfrm>
+      </p:grpSpPr>
+      <p:pic>
+        <p:nvPicPr>
+          <p:cNvPr id="3" name="Picture 2" descr="A close up of a fan&#10;&#10;Description automatically generated">
+            <a:extLst>
+              <a:ext uri="{FF2B5EF4-FFF2-40B4-BE49-F238E27FC236}">
+                <a16:creationId xmlns:a16="http://schemas.microsoft.com/office/drawing/2014/main" id="{7883582D-DC0F-43BC-A454-68C0E67454B6}"/>
+              </a:ext>
+            </a:extLst>
+          </p:cNvPr>
+          <p:cNvPicPr>
+            <a:picLocks noChangeAspect="1"/>
+          </p:cNvPicPr>
+          <p:nvPr/>
+        </p:nvPicPr>
+        <p:blipFill>
+          <a:blip r:embed="rId2">
+            <a:extLst>
+              <a:ext uri="{28A0092B-C50C-407E-A947-70E740481C1C}">
+                <a14:useLocalDpi xmlns:a14="http://schemas.microsoft.com/office/drawing/2010/main" val="0"/>
+              </a:ext>
+            </a:extLst>
+          </a:blip>
+          <a:stretch>
+            <a:fillRect/>
+          </a:stretch>
+        </p:blipFill>
+        <p:spPr>
+          <a:xfrm>
+            <a:off x="2956432" y="1783308"/>
+            <a:ext cx="3291379" cy="3291379"/>
+          </a:xfrm>
+          <a:prstGeom prst="rect">
+            <a:avLst/>
+          </a:prstGeom>
+        </p:spPr>
+      </p:pic>
+      <p:sp>
+        <p:nvSpPr>
+          <p:cNvPr id="4" name="TextBox 3">
+            <a:extLst>
+              <a:ext uri="{FF2B5EF4-FFF2-40B4-BE49-F238E27FC236}">
+                <a16:creationId xmlns:a16="http://schemas.microsoft.com/office/drawing/2014/main" id="{E1F832DA-7082-4BCE-999C-F3C3ECA2DEFD}"/>
+              </a:ext>
+            </a:extLst>
+          </p:cNvPr>
+          <p:cNvSpPr txBox="1"/>
+          <p:nvPr/>
+        </p:nvSpPr>
+        <p:spPr>
+          <a:xfrm>
+            <a:off x="4466030" y="3290499"/>
+            <a:ext cx="263214" cy="276999"/>
+          </a:xfrm>
+          <a:prstGeom prst="rect">
+            <a:avLst/>
+          </a:prstGeom>
+          <a:noFill/>
+        </p:spPr>
+        <p:txBody>
+          <a:bodyPr wrap="none" rtlCol="0">
+            <a:spAutoFit/>
+          </a:bodyPr>
+          <a:lstStyle/>
+          <a:p>
+            <a:r>
+              <a:rPr lang="en-AU" sz="1200" dirty="0"/>
+              <a:t>0</a:t>
+            </a:r>
+          </a:p>
+        </p:txBody>
+      </p:sp>
+      <p:sp>
+        <p:nvSpPr>
+          <p:cNvPr id="5" name="TextBox 4">
+            <a:extLst>
+              <a:ext uri="{FF2B5EF4-FFF2-40B4-BE49-F238E27FC236}">
+                <a16:creationId xmlns:a16="http://schemas.microsoft.com/office/drawing/2014/main" id="{5EBB5C90-7451-4CC9-BE80-8E458BB5563C}"/>
+              </a:ext>
+            </a:extLst>
+          </p:cNvPr>
+          <p:cNvSpPr txBox="1"/>
+          <p:nvPr/>
+        </p:nvSpPr>
+        <p:spPr>
+          <a:xfrm>
+            <a:off x="4602122" y="3120047"/>
+            <a:ext cx="328936" cy="261610"/>
+          </a:xfrm>
+          <a:prstGeom prst="rect">
+            <a:avLst/>
+          </a:prstGeom>
+          <a:noFill/>
+        </p:spPr>
+        <p:txBody>
+          <a:bodyPr wrap="none" rtlCol="0">
+            <a:spAutoFit/>
+          </a:bodyPr>
+          <a:lstStyle/>
+          <a:p>
+            <a:r>
+              <a:rPr lang="en-AU" sz="1050" dirty="0">
+                <a:solidFill>
+                  <a:schemeClr val="bg1"/>
+                </a:solidFill>
+              </a:rPr>
+              <a:t>25</a:t>
+            </a:r>
+          </a:p>
+        </p:txBody>
+      </p:sp>
+      <p:sp>
+        <p:nvSpPr>
+          <p:cNvPr id="6" name="TextBox 5">
+            <a:extLst>
+              <a:ext uri="{FF2B5EF4-FFF2-40B4-BE49-F238E27FC236}">
+                <a16:creationId xmlns:a16="http://schemas.microsoft.com/office/drawing/2014/main" id="{7CDF5C3A-99FD-4C64-8CF2-832D33010952}"/>
+              </a:ext>
+            </a:extLst>
+          </p:cNvPr>
+          <p:cNvSpPr txBox="1"/>
+          <p:nvPr/>
+        </p:nvSpPr>
+        <p:spPr>
+          <a:xfrm>
+            <a:off x="4736940" y="2970354"/>
+            <a:ext cx="322524" cy="253916"/>
+          </a:xfrm>
+          <a:prstGeom prst="rect">
+            <a:avLst/>
+          </a:prstGeom>
+          <a:noFill/>
+        </p:spPr>
+        <p:txBody>
+          <a:bodyPr wrap="none" rtlCol="0">
+            <a:spAutoFit/>
+          </a:bodyPr>
+          <a:lstStyle/>
+          <a:p>
+            <a:r>
+              <a:rPr lang="en-AU" sz="1050" dirty="0">
+                <a:solidFill>
+                  <a:schemeClr val="bg1"/>
+                </a:solidFill>
+              </a:rPr>
+              <a:t>50</a:t>
+            </a:r>
+          </a:p>
+        </p:txBody>
+      </p:sp>
+      <p:sp>
+        <p:nvSpPr>
+          <p:cNvPr id="7" name="TextBox 6">
+            <a:extLst>
+              <a:ext uri="{FF2B5EF4-FFF2-40B4-BE49-F238E27FC236}">
+                <a16:creationId xmlns:a16="http://schemas.microsoft.com/office/drawing/2014/main" id="{901E94CD-815D-454A-B4AD-1EC874B8AEB0}"/>
+              </a:ext>
+            </a:extLst>
+          </p:cNvPr>
+          <p:cNvSpPr txBox="1"/>
+          <p:nvPr/>
+        </p:nvSpPr>
+        <p:spPr>
+          <a:xfrm>
+            <a:off x="4865346" y="2860488"/>
+            <a:ext cx="322524" cy="253916"/>
+          </a:xfrm>
+          <a:prstGeom prst="rect">
+            <a:avLst/>
+          </a:prstGeom>
+          <a:noFill/>
+        </p:spPr>
+        <p:txBody>
+          <a:bodyPr wrap="none" rtlCol="0">
+            <a:spAutoFit/>
+          </a:bodyPr>
+          <a:lstStyle/>
+          <a:p>
+            <a:r>
+              <a:rPr lang="en-AU" sz="1050" dirty="0">
+                <a:solidFill>
+                  <a:schemeClr val="bg1"/>
+                </a:solidFill>
+              </a:rPr>
+              <a:t>75</a:t>
+            </a:r>
+          </a:p>
+        </p:txBody>
+      </p:sp>
+      <p:sp>
+        <p:nvSpPr>
+          <p:cNvPr id="14" name="TextBox 13">
+            <a:extLst>
+              <a:ext uri="{FF2B5EF4-FFF2-40B4-BE49-F238E27FC236}">
+                <a16:creationId xmlns:a16="http://schemas.microsoft.com/office/drawing/2014/main" id="{E2F89064-D640-4490-8B60-31ADF1B92F52}"/>
+              </a:ext>
+            </a:extLst>
+          </p:cNvPr>
+          <p:cNvSpPr txBox="1"/>
+          <p:nvPr/>
+        </p:nvSpPr>
+        <p:spPr>
+          <a:xfrm>
+            <a:off x="4987340" y="2708744"/>
+            <a:ext cx="391454" cy="253916"/>
+          </a:xfrm>
+          <a:prstGeom prst="rect">
+            <a:avLst/>
+          </a:prstGeom>
+          <a:noFill/>
+        </p:spPr>
+        <p:txBody>
+          <a:bodyPr wrap="none" rtlCol="0">
+            <a:spAutoFit/>
+          </a:bodyPr>
+          <a:lstStyle/>
+          <a:p>
+            <a:r>
+              <a:rPr lang="en-AU" sz="1050" dirty="0">
+                <a:solidFill>
+                  <a:schemeClr val="bg1"/>
+                </a:solidFill>
+              </a:rPr>
+              <a:t>100</a:t>
+            </a:r>
+          </a:p>
+        </p:txBody>
+      </p:sp>
+      <p:sp>
+        <p:nvSpPr>
+          <p:cNvPr id="15" name="TextBox 14">
+            <a:extLst>
+              <a:ext uri="{FF2B5EF4-FFF2-40B4-BE49-F238E27FC236}">
+                <a16:creationId xmlns:a16="http://schemas.microsoft.com/office/drawing/2014/main" id="{755A290B-F12A-452E-A2C8-ADAE8ED38A2B}"/>
+              </a:ext>
+            </a:extLst>
+          </p:cNvPr>
+          <p:cNvSpPr txBox="1"/>
+          <p:nvPr/>
+        </p:nvSpPr>
+        <p:spPr>
+          <a:xfrm>
+            <a:off x="5113612" y="2567597"/>
+            <a:ext cx="391454" cy="253916"/>
+          </a:xfrm>
+          <a:prstGeom prst="rect">
+            <a:avLst/>
+          </a:prstGeom>
+          <a:noFill/>
+        </p:spPr>
+        <p:txBody>
+          <a:bodyPr wrap="none" rtlCol="0">
+            <a:spAutoFit/>
+          </a:bodyPr>
+          <a:lstStyle/>
+          <a:p>
+            <a:r>
+              <a:rPr lang="en-AU" sz="1050" dirty="0">
+                <a:solidFill>
+                  <a:schemeClr val="bg1"/>
+                </a:solidFill>
+              </a:rPr>
+              <a:t>125</a:t>
+            </a:r>
+          </a:p>
+        </p:txBody>
+      </p:sp>
+      <p:sp>
+        <p:nvSpPr>
+          <p:cNvPr id="16" name="TextBox 15">
+            <a:extLst>
+              <a:ext uri="{FF2B5EF4-FFF2-40B4-BE49-F238E27FC236}">
+                <a16:creationId xmlns:a16="http://schemas.microsoft.com/office/drawing/2014/main" id="{6841874E-DB5A-44ED-A93A-ED23E16ED6E7}"/>
+              </a:ext>
+            </a:extLst>
+          </p:cNvPr>
+          <p:cNvSpPr txBox="1"/>
+          <p:nvPr/>
+        </p:nvSpPr>
+        <p:spPr>
+          <a:xfrm>
+            <a:off x="5250564" y="2449185"/>
+            <a:ext cx="391454" cy="253916"/>
+          </a:xfrm>
+          <a:prstGeom prst="rect">
+            <a:avLst/>
+          </a:prstGeom>
+          <a:noFill/>
+        </p:spPr>
+        <p:txBody>
+          <a:bodyPr wrap="none" rtlCol="0">
+            <a:spAutoFit/>
+          </a:bodyPr>
+          <a:lstStyle/>
+          <a:p>
+            <a:r>
+              <a:rPr lang="en-AU" sz="1050" dirty="0">
+                <a:solidFill>
+                  <a:schemeClr val="bg1"/>
+                </a:solidFill>
+              </a:rPr>
+              <a:t>150</a:t>
+            </a:r>
+          </a:p>
+        </p:txBody>
+      </p:sp>
+      <p:sp>
+        <p:nvSpPr>
+          <p:cNvPr id="17" name="TextBox 16">
+            <a:extLst>
+              <a:ext uri="{FF2B5EF4-FFF2-40B4-BE49-F238E27FC236}">
+                <a16:creationId xmlns:a16="http://schemas.microsoft.com/office/drawing/2014/main" id="{249EEAEA-B367-4989-8B81-C040D435D6DF}"/>
+              </a:ext>
+            </a:extLst>
+          </p:cNvPr>
+          <p:cNvSpPr txBox="1"/>
+          <p:nvPr/>
+        </p:nvSpPr>
+        <p:spPr>
+          <a:xfrm>
+            <a:off x="5388904" y="2335472"/>
+            <a:ext cx="391454" cy="253916"/>
+          </a:xfrm>
+          <a:prstGeom prst="rect">
+            <a:avLst/>
+          </a:prstGeom>
+          <a:noFill/>
+        </p:spPr>
+        <p:txBody>
+          <a:bodyPr wrap="none" rtlCol="0">
+            <a:spAutoFit/>
+          </a:bodyPr>
+          <a:lstStyle/>
+          <a:p>
+            <a:r>
+              <a:rPr lang="en-AU" sz="1050" dirty="0">
+                <a:solidFill>
+                  <a:schemeClr val="bg1"/>
+                </a:solidFill>
+              </a:rPr>
+              <a:t>175</a:t>
+            </a:r>
+          </a:p>
+        </p:txBody>
+      </p:sp>
+      <p:sp>
+        <p:nvSpPr>
+          <p:cNvPr id="18" name="TextBox 17">
+            <a:extLst>
+              <a:ext uri="{FF2B5EF4-FFF2-40B4-BE49-F238E27FC236}">
+                <a16:creationId xmlns:a16="http://schemas.microsoft.com/office/drawing/2014/main" id="{0A40AEE5-F977-44DD-82A0-9FFF6232C6B1}"/>
+              </a:ext>
+            </a:extLst>
+          </p:cNvPr>
+          <p:cNvSpPr txBox="1"/>
+          <p:nvPr/>
+        </p:nvSpPr>
+        <p:spPr>
+          <a:xfrm>
+            <a:off x="5523722" y="2185779"/>
+            <a:ext cx="391454" cy="253916"/>
+          </a:xfrm>
+          <a:prstGeom prst="rect">
+            <a:avLst/>
+          </a:prstGeom>
+          <a:noFill/>
+        </p:spPr>
+        <p:txBody>
+          <a:bodyPr wrap="none" rtlCol="0">
+            <a:spAutoFit/>
+          </a:bodyPr>
+          <a:lstStyle/>
+          <a:p>
+            <a:r>
+              <a:rPr lang="en-AU" sz="1050" dirty="0">
+                <a:solidFill>
+                  <a:schemeClr val="bg1"/>
+                </a:solidFill>
+              </a:rPr>
+              <a:t>200</a:t>
+            </a:r>
+          </a:p>
+        </p:txBody>
+      </p:sp>
+    </p:spTree>
+    <p:extLst>
+      <p:ext uri="{BB962C8B-B14F-4D97-AF65-F5344CB8AC3E}">
+        <p14:creationId xmlns:p14="http://schemas.microsoft.com/office/powerpoint/2010/main" val="1590727457"/>
+      </p:ext>
+    </p:extLst>
+  </p:cSld>
+  <p:clrMapOvr>
+    <a:masterClrMapping/>
+  </p:clrMapOvr>
+</p:sld>
+</file>
+
 <file path=ppt/theme/theme1.xml><?xml version="1.0" encoding="utf-8"?>
 <a:theme xmlns:a="http://schemas.openxmlformats.org/drawingml/2006/main" name="Office Theme">
   <a:themeElements>

</xml_diff>